<commit_message>
fixed typo in L10.3
</commit_message>
<xml_diff>
--- a/Slides/Lesson 10.3 Real State vs Simulated State.pptx
+++ b/Slides/Lesson 10.3 Real State vs Simulated State.pptx
@@ -139,6 +139,9 @@
         </p15:guide>
       </p15:sldGuideLst>
     </p:ext>
+    <p:ext uri="{2D200454-40CA-4A62-9FC3-DE9A4176ACB9}">
+      <p15:notesGuideLst xmlns:p15="http://schemas.microsoft.com/office/powerpoint/2012/main"/>
+    </p:ext>
   </p:extLst>
 </p:presentation>
 </file>
@@ -225,7 +228,7 @@
           <a:p>
             <a:fld id="{584A33CD-551F-40DB-981D-1DE469B6C061}" type="datetimeFigureOut">
               <a:rPr lang="en-US" smtClean="0"/>
-              <a:t>11/8/2015</a:t>
+              <a:t>11/15/2015</a:t>
             </a:fld>
             <a:endParaRPr lang="en-US"/>
           </a:p>
@@ -1018,7 +1021,7 @@
           <a:p>
             <a:fld id="{2F1F79F5-7BEC-496A-AFC7-876E38F64D71}" type="datetime1">
               <a:rPr lang="en-US" smtClean="0"/>
-              <a:t>11/8/2015</a:t>
+              <a:t>11/15/2015</a:t>
             </a:fld>
             <a:endParaRPr lang="en-US"/>
           </a:p>
@@ -1143,7 +1146,7 @@
           <a:p>
             <a:fld id="{2F7B77F5-1464-4F6B-92A8-64FC8A508293}" type="datetime1">
               <a:rPr lang="en-US" smtClean="0"/>
-              <a:t>11/8/2015</a:t>
+              <a:t>11/15/2015</a:t>
             </a:fld>
             <a:endParaRPr lang="en-US"/>
           </a:p>
@@ -1245,7 +1248,7 @@
           <a:p>
             <a:fld id="{0A05703A-7669-4FEA-9056-25299B4D29D4}" type="datetime1">
               <a:rPr lang="en-US" smtClean="0"/>
-              <a:t>11/8/2015</a:t>
+              <a:t>11/15/2015</a:t>
             </a:fld>
             <a:endParaRPr lang="en-US"/>
           </a:p>
@@ -1522,7 +1525,7 @@
           <a:p>
             <a:fld id="{6E5077B5-BB57-49DB-88CA-226A139E5C01}" type="datetime1">
               <a:rPr lang="en-US" smtClean="0"/>
-              <a:t>11/8/2015</a:t>
+              <a:t>11/15/2015</a:t>
             </a:fld>
             <a:endParaRPr lang="en-US"/>
           </a:p>
@@ -1775,7 +1778,7 @@
           <a:p>
             <a:fld id="{C48D9447-CBD6-49A1-89FD-8512A8CF8999}" type="datetime1">
               <a:rPr lang="en-US" smtClean="0"/>
-              <a:t>11/8/2015</a:t>
+              <a:t>11/15/2015</a:t>
             </a:fld>
             <a:endParaRPr lang="en-US"/>
           </a:p>
@@ -1945,7 +1948,7 @@
           <a:p>
             <a:fld id="{A3639A2A-823D-48B7-9ACE-7FAF42870BA9}" type="datetime1">
               <a:rPr lang="en-US" smtClean="0"/>
-              <a:t>11/8/2015</a:t>
+              <a:t>11/15/2015</a:t>
             </a:fld>
             <a:endParaRPr lang="en-US"/>
           </a:p>
@@ -2125,7 +2128,7 @@
           <a:p>
             <a:fld id="{ED1B6996-82E9-463C-972C-7B56056E426C}" type="datetime1">
               <a:rPr lang="en-US" smtClean="0"/>
-              <a:t>11/8/2015</a:t>
+              <a:t>11/15/2015</a:t>
             </a:fld>
             <a:endParaRPr lang="en-US"/>
           </a:p>
@@ -2308,7 +2311,7 @@
           <a:p>
             <a:fld id="{E22ED4DA-448D-4BB1-B935-CC112220207B}" type="datetime1">
               <a:rPr lang="en-US" smtClean="0"/>
-              <a:t>11/8/2015</a:t>
+              <a:t>11/15/2015</a:t>
             </a:fld>
             <a:endParaRPr lang="en-US"/>
           </a:p>
@@ -2490,7 +2493,7 @@
           <a:p>
             <a:fld id="{E22ED4DA-448D-4BB1-B935-CC112220207B}" type="datetime1">
               <a:rPr lang="en-US" smtClean="0"/>
-              <a:t>11/8/2015</a:t>
+              <a:t>11/15/2015</a:t>
             </a:fld>
             <a:endParaRPr lang="en-US"/>
           </a:p>
@@ -2759,7 +2762,7 @@
           <a:p>
             <a:fld id="{FF5D65A6-AB94-4435-B0B7-3743215FA46C}" type="datetime1">
               <a:rPr lang="en-US" smtClean="0"/>
-              <a:t>11/8/2015</a:t>
+              <a:t>11/15/2015</a:t>
             </a:fld>
             <a:endParaRPr lang="en-US"/>
           </a:p>
@@ -3062,7 +3065,7 @@
           <a:p>
             <a:fld id="{5D1846AD-9252-4647-9435-4C2AC365653A}" type="datetime1">
               <a:rPr lang="en-US" smtClean="0"/>
-              <a:t>11/8/2015</a:t>
+              <a:t>11/15/2015</a:t>
             </a:fld>
             <a:endParaRPr lang="en-US"/>
           </a:p>
@@ -3240,7 +3243,7 @@
           <a:p>
             <a:fld id="{FF5D65A6-AB94-4435-B0B7-3743215FA46C}" type="datetime1">
               <a:rPr lang="en-US" smtClean="0"/>
-              <a:t>11/8/2015</a:t>
+              <a:t>11/15/2015</a:t>
             </a:fld>
             <a:endParaRPr lang="en-US"/>
           </a:p>
@@ -3542,7 +3545,7 @@
           <a:p>
             <a:fld id="{7C193DC4-6EF0-48C9-B29C-616106A645E1}" type="datetime1">
               <a:rPr lang="en-US" smtClean="0"/>
-              <a:t>11/8/2015</a:t>
+              <a:t>11/15/2015</a:t>
             </a:fld>
             <a:endParaRPr lang="en-US"/>
           </a:p>
@@ -3830,7 +3833,7 @@
           <a:p>
             <a:fld id="{5D1846AD-9252-4647-9435-4C2AC365653A}" type="datetime1">
               <a:rPr lang="en-US" smtClean="0"/>
-              <a:t>11/8/2015</a:t>
+              <a:t>11/15/2015</a:t>
             </a:fld>
             <a:endParaRPr lang="en-US"/>
           </a:p>
@@ -4252,7 +4255,7 @@
           <a:p>
             <a:fld id="{CE56DC10-3561-4063-A6AF-C1CC7A41040A}" type="datetime1">
               <a:rPr lang="en-US" smtClean="0"/>
-              <a:t>11/8/2015</a:t>
+              <a:t>11/15/2015</a:t>
             </a:fld>
             <a:endParaRPr lang="en-US"/>
           </a:p>
@@ -4477,7 +4480,7 @@
           <a:p>
             <a:fld id="{02B3F677-983B-48DB-ADFD-63FE6CBC7FB2}" type="datetime1">
               <a:rPr lang="en-US" smtClean="0"/>
-              <a:t>11/8/2015</a:t>
+              <a:t>11/15/2015</a:t>
             </a:fld>
             <a:endParaRPr lang="en-US"/>
           </a:p>
@@ -4924,11 +4927,7 @@
           <a:p>
             <a:r>
               <a:rPr lang="en-US" dirty="0" smtClean="0"/>
-              <a:t>Lesson </a:t>
-            </a:r>
-            <a:r>
-              <a:rPr lang="en-US" dirty="0" smtClean="0"/>
-              <a:t>10.3</a:t>
+              <a:t>Lesson 10.3</a:t>
             </a:r>
             <a:endParaRPr lang="en-US" dirty="0"/>
           </a:p>
@@ -5706,41 +5705,19 @@
           <a:p>
             <a:r>
               <a:rPr lang="en-US" dirty="0" smtClean="0"/>
-              <a:t>When the </a:t>
-            </a:r>
-            <a:r>
-              <a:rPr lang="en-US" dirty="0" smtClean="0"/>
-              <a:t>wall changes</a:t>
-            </a:r>
-            <a:r>
-              <a:rPr lang="en-US" dirty="0" smtClean="0"/>
-              <a:t>, all the balls have to see it</a:t>
-            </a:r>
-            <a:r>
-              <a:rPr lang="en-US" dirty="0" smtClean="0"/>
-              <a:t>. </a:t>
-            </a:r>
-            <a:endParaRPr lang="en-US" dirty="0" smtClean="0"/>
-          </a:p>
-          <a:p>
-            <a:r>
-              <a:rPr lang="en-US" dirty="0" smtClean="0"/>
-              <a:t>The balls all have to look at the same </a:t>
-            </a:r>
-            <a:r>
-              <a:rPr lang="en-US" dirty="0" smtClean="0"/>
-              <a:t>wall.</a:t>
-            </a:r>
-            <a:endParaRPr lang="en-US" dirty="0" smtClean="0"/>
-          </a:p>
-          <a:p>
-            <a:r>
-              <a:rPr lang="en-US" dirty="0" smtClean="0"/>
-              <a:t>So let's make the </a:t>
-            </a:r>
-            <a:r>
-              <a:rPr lang="en-US" dirty="0" smtClean="0"/>
-              <a:t>wall </a:t>
+              <a:t>When the wall changes, all the balls have to see it. </a:t>
+            </a:r>
+          </a:p>
+          <a:p>
+            <a:r>
+              <a:rPr lang="en-US" dirty="0" smtClean="0"/>
+              <a:t>The balls all have to look at the same wall.</a:t>
+            </a:r>
+          </a:p>
+          <a:p>
+            <a:r>
+              <a:rPr lang="en-US" dirty="0" smtClean="0"/>
+              <a:t>So let's make the wall </a:t>
             </a:r>
             <a:r>
               <a:rPr lang="en-US" dirty="0" err="1" smtClean="0"/>
@@ -5754,12 +5731,13 @@
           <a:p>
             <a:r>
               <a:rPr lang="en-US" dirty="0" smtClean="0"/>
-              <a:t>In the next lesson, we'll see how to </a:t>
-            </a:r>
-            <a:r>
-              <a:rPr lang="en-US" dirty="0" smtClean="0"/>
-              <a:t>design code that accomplishes.</a:t>
-            </a:r>
+              <a:t>In the next lesson, we'll see how to design code that </a:t>
+            </a:r>
+            <a:r>
+              <a:rPr lang="en-US" smtClean="0"/>
+              <a:t>accomplishes this.</a:t>
+            </a:r>
+            <a:endParaRPr lang="en-US" dirty="0" smtClean="0"/>
           </a:p>
           <a:p>
             <a:pPr lvl="1"/>
@@ -5767,7 +5745,6 @@
               <a:rPr lang="en-US" dirty="0" smtClean="0"/>
               <a:t>Remember, "design" means getting what you know out of your head and onto the page</a:t>
             </a:r>
-            <a:endParaRPr lang="en-US" dirty="0" smtClean="0"/>
           </a:p>
         </p:txBody>
       </p:sp>

</xml_diff>